<commit_message>
changing design and adding buttons
</commit_message>
<xml_diff>
--- a/powerpoint/Structure_Projet.pptx
+++ b/powerpoint/Structure_Projet.pptx
@@ -855,7 +855,7 @@
           <a:p>
             <a:fld id="{D9578751-DA34-41BA-ACFB-BD878EA789F8}" type="datetimeFigureOut">
               <a:rPr lang="fr-FR" smtClean="0"/>
-              <a:t>19/05/2021</a:t>
+              <a:t>20/05/2021</a:t>
             </a:fld>
             <a:endParaRPr lang="fr-FR"/>
           </a:p>
@@ -1053,7 +1053,7 @@
           <a:p>
             <a:fld id="{D9578751-DA34-41BA-ACFB-BD878EA789F8}" type="datetimeFigureOut">
               <a:rPr lang="fr-FR" smtClean="0"/>
-              <a:t>19/05/2021</a:t>
+              <a:t>20/05/2021</a:t>
             </a:fld>
             <a:endParaRPr lang="fr-FR"/>
           </a:p>
@@ -1261,7 +1261,7 @@
           <a:p>
             <a:fld id="{D9578751-DA34-41BA-ACFB-BD878EA789F8}" type="datetimeFigureOut">
               <a:rPr lang="fr-FR" smtClean="0"/>
-              <a:t>19/05/2021</a:t>
+              <a:t>20/05/2021</a:t>
             </a:fld>
             <a:endParaRPr lang="fr-FR"/>
           </a:p>
@@ -1459,7 +1459,7 @@
           <a:p>
             <a:fld id="{D9578751-DA34-41BA-ACFB-BD878EA789F8}" type="datetimeFigureOut">
               <a:rPr lang="fr-FR" smtClean="0"/>
-              <a:t>19/05/2021</a:t>
+              <a:t>20/05/2021</a:t>
             </a:fld>
             <a:endParaRPr lang="fr-FR"/>
           </a:p>
@@ -1734,7 +1734,7 @@
           <a:p>
             <a:fld id="{D9578751-DA34-41BA-ACFB-BD878EA789F8}" type="datetimeFigureOut">
               <a:rPr lang="fr-FR" smtClean="0"/>
-              <a:t>19/05/2021</a:t>
+              <a:t>20/05/2021</a:t>
             </a:fld>
             <a:endParaRPr lang="fr-FR"/>
           </a:p>
@@ -1999,7 +1999,7 @@
           <a:p>
             <a:fld id="{D9578751-DA34-41BA-ACFB-BD878EA789F8}" type="datetimeFigureOut">
               <a:rPr lang="fr-FR" smtClean="0"/>
-              <a:t>19/05/2021</a:t>
+              <a:t>20/05/2021</a:t>
             </a:fld>
             <a:endParaRPr lang="fr-FR"/>
           </a:p>
@@ -2411,7 +2411,7 @@
           <a:p>
             <a:fld id="{D9578751-DA34-41BA-ACFB-BD878EA789F8}" type="datetimeFigureOut">
               <a:rPr lang="fr-FR" smtClean="0"/>
-              <a:t>19/05/2021</a:t>
+              <a:t>20/05/2021</a:t>
             </a:fld>
             <a:endParaRPr lang="fr-FR"/>
           </a:p>
@@ -2552,7 +2552,7 @@
           <a:p>
             <a:fld id="{D9578751-DA34-41BA-ACFB-BD878EA789F8}" type="datetimeFigureOut">
               <a:rPr lang="fr-FR" smtClean="0"/>
-              <a:t>19/05/2021</a:t>
+              <a:t>20/05/2021</a:t>
             </a:fld>
             <a:endParaRPr lang="fr-FR"/>
           </a:p>
@@ -2665,7 +2665,7 @@
           <a:p>
             <a:fld id="{D9578751-DA34-41BA-ACFB-BD878EA789F8}" type="datetimeFigureOut">
               <a:rPr lang="fr-FR" smtClean="0"/>
-              <a:t>19/05/2021</a:t>
+              <a:t>20/05/2021</a:t>
             </a:fld>
             <a:endParaRPr lang="fr-FR"/>
           </a:p>
@@ -2976,7 +2976,7 @@
           <a:p>
             <a:fld id="{D9578751-DA34-41BA-ACFB-BD878EA789F8}" type="datetimeFigureOut">
               <a:rPr lang="fr-FR" smtClean="0"/>
-              <a:t>19/05/2021</a:t>
+              <a:t>20/05/2021</a:t>
             </a:fld>
             <a:endParaRPr lang="fr-FR"/>
           </a:p>
@@ -3264,7 +3264,7 @@
           <a:p>
             <a:fld id="{D9578751-DA34-41BA-ACFB-BD878EA789F8}" type="datetimeFigureOut">
               <a:rPr lang="fr-FR" smtClean="0"/>
-              <a:t>19/05/2021</a:t>
+              <a:t>20/05/2021</a:t>
             </a:fld>
             <a:endParaRPr lang="fr-FR"/>
           </a:p>
@@ -3505,7 +3505,7 @@
           <a:p>
             <a:fld id="{D9578751-DA34-41BA-ACFB-BD878EA789F8}" type="datetimeFigureOut">
               <a:rPr lang="fr-FR" smtClean="0"/>
-              <a:t>19/05/2021</a:t>
+              <a:t>20/05/2021</a:t>
             </a:fld>
             <a:endParaRPr lang="fr-FR"/>
           </a:p>
@@ -3924,10 +3924,10 @@
       </p:grpSpPr>
       <p:grpSp>
         <p:nvGrpSpPr>
-          <p:cNvPr id="41" name="Groupe 40">
-            <a:extLst>
-              <a:ext uri="{FF2B5EF4-FFF2-40B4-BE49-F238E27FC236}">
-                <a16:creationId xmlns:a16="http://schemas.microsoft.com/office/drawing/2014/main" id="{A1BFF3A5-26FC-4704-A51F-B924072706C1}"/>
+          <p:cNvPr id="2" name="Groupe 1">
+            <a:extLst>
+              <a:ext uri="{FF2B5EF4-FFF2-40B4-BE49-F238E27FC236}">
+                <a16:creationId xmlns:a16="http://schemas.microsoft.com/office/drawing/2014/main" id="{DDC27DB1-A2EA-0145-9E9D-CD6E4F042F24}"/>
               </a:ext>
             </a:extLst>
           </p:cNvPr>
@@ -3938,70 +3938,16 @@
           <a:xfrm>
             <a:off x="0" y="0"/>
             <a:ext cx="12192000" cy="6857999"/>
-            <a:chOff x="2500745" y="91440"/>
-            <a:chExt cx="7190510" cy="4339243"/>
+            <a:chOff x="0" y="0"/>
+            <a:chExt cx="12192000" cy="6857999"/>
           </a:xfrm>
         </p:grpSpPr>
-        <p:sp>
-          <p:nvSpPr>
-            <p:cNvPr id="4" name="Rectangle : coins arrondis 3">
+        <p:grpSp>
+          <p:nvGrpSpPr>
+            <p:cNvPr id="41" name="Groupe 40">
               <a:extLst>
                 <a:ext uri="{FF2B5EF4-FFF2-40B4-BE49-F238E27FC236}">
-                  <a16:creationId xmlns:a16="http://schemas.microsoft.com/office/drawing/2014/main" id="{007E6DC0-0077-4729-8DF2-C384615C8D79}"/>
-                </a:ext>
-              </a:extLst>
-            </p:cNvPr>
-            <p:cNvSpPr/>
-            <p:nvPr/>
-          </p:nvSpPr>
-          <p:spPr>
-            <a:xfrm>
-              <a:off x="2500745" y="91440"/>
-              <a:ext cx="7190510" cy="4339243"/>
-            </a:xfrm>
-            <a:prstGeom prst="roundRect">
-              <a:avLst>
-                <a:gd name="adj" fmla="val 3831"/>
-              </a:avLst>
-            </a:prstGeom>
-            <a:solidFill>
-              <a:srgbClr val="3AB395"/>
-            </a:solidFill>
-            <a:ln>
-              <a:noFill/>
-            </a:ln>
-          </p:spPr>
-          <p:style>
-            <a:lnRef idx="2">
-              <a:schemeClr val="accent1">
-                <a:shade val="50000"/>
-              </a:schemeClr>
-            </a:lnRef>
-            <a:fillRef idx="1">
-              <a:schemeClr val="accent1"/>
-            </a:fillRef>
-            <a:effectRef idx="0">
-              <a:schemeClr val="accent1"/>
-            </a:effectRef>
-            <a:fontRef idx="minor">
-              <a:schemeClr val="lt1"/>
-            </a:fontRef>
-          </p:style>
-          <p:txBody>
-            <a:bodyPr rtlCol="0" anchor="ctr"/>
-            <a:lstStyle/>
-            <a:p>
-              <a:pPr algn="ctr"/>
-              <a:endParaRPr lang="fr-FR"/>
-            </a:p>
-          </p:txBody>
-        </p:sp>
-        <p:grpSp>
-          <p:nvGrpSpPr>
-            <p:cNvPr id="21" name="Groupe 20">
-              <a:extLst>
-                <a:ext uri="{FF2B5EF4-FFF2-40B4-BE49-F238E27FC236}">
-                  <a16:creationId xmlns:a16="http://schemas.microsoft.com/office/drawing/2014/main" id="{3DDBB08A-3545-42FD-A31E-9735D388A1EC}"/>
+                  <a16:creationId xmlns:a16="http://schemas.microsoft.com/office/drawing/2014/main" id="{A1BFF3A5-26FC-4704-A51F-B924072706C1}"/>
                 </a:ext>
               </a:extLst>
             </p:cNvPr>
@@ -4010,18 +3956,18 @@
           </p:nvGrpSpPr>
           <p:grpSpPr>
             <a:xfrm>
-              <a:off x="2586641" y="793864"/>
-              <a:ext cx="3442855" cy="3466408"/>
-              <a:chOff x="2653144" y="527857"/>
-              <a:chExt cx="3442855" cy="3466408"/>
+              <a:off x="0" y="0"/>
+              <a:ext cx="12192000" cy="6857999"/>
+              <a:chOff x="2500745" y="91440"/>
+              <a:chExt cx="7190510" cy="4339243"/>
             </a:xfrm>
           </p:grpSpPr>
           <p:sp>
             <p:nvSpPr>
-              <p:cNvPr id="8" name="Rectangle : coins arrondis 7">
+              <p:cNvPr id="4" name="Rectangle : coins arrondis 3">
                 <a:extLst>
                   <a:ext uri="{FF2B5EF4-FFF2-40B4-BE49-F238E27FC236}">
-                    <a16:creationId xmlns:a16="http://schemas.microsoft.com/office/drawing/2014/main" id="{A5557395-889E-4AB5-9EA2-FB609C6B2656}"/>
+                    <a16:creationId xmlns:a16="http://schemas.microsoft.com/office/drawing/2014/main" id="{007E6DC0-0077-4729-8DF2-C384615C8D79}"/>
                   </a:ext>
                 </a:extLst>
               </p:cNvPr>
@@ -4030,14 +3976,16 @@
             </p:nvSpPr>
             <p:spPr>
               <a:xfrm>
-                <a:off x="2653144" y="527857"/>
-                <a:ext cx="3442855" cy="3466408"/>
+                <a:off x="2500745" y="91440"/>
+                <a:ext cx="7190510" cy="4339243"/>
               </a:xfrm>
               <a:prstGeom prst="roundRect">
-                <a:avLst/>
+                <a:avLst>
+                  <a:gd name="adj" fmla="val 3831"/>
+                </a:avLst>
               </a:prstGeom>
               <a:solidFill>
-                <a:schemeClr val="bg1"/>
+                <a:srgbClr val="3AB395"/>
               </a:solidFill>
               <a:ln>
                 <a:noFill/>
@@ -4068,291 +4016,12 @@
               </a:p>
             </p:txBody>
           </p:sp>
-          <p:sp>
-            <p:nvSpPr>
-              <p:cNvPr id="9" name="Rectangle 8">
+          <p:grpSp>
+            <p:nvGrpSpPr>
+              <p:cNvPr id="21" name="Groupe 20">
                 <a:extLst>
                   <a:ext uri="{FF2B5EF4-FFF2-40B4-BE49-F238E27FC236}">
-                    <a16:creationId xmlns:a16="http://schemas.microsoft.com/office/drawing/2014/main" id="{3A5E93C8-3108-4120-8AC8-88957A3FCA17}"/>
-                  </a:ext>
-                </a:extLst>
-              </p:cNvPr>
-              <p:cNvSpPr/>
-              <p:nvPr/>
-            </p:nvSpPr>
-            <p:spPr>
-              <a:xfrm>
-                <a:off x="3148444" y="1878676"/>
-                <a:ext cx="2452254" cy="382385"/>
-              </a:xfrm>
-              <a:prstGeom prst="rect">
-                <a:avLst/>
-              </a:prstGeom>
-              <a:solidFill>
-                <a:schemeClr val="bg1">
-                  <a:lumMod val="95000"/>
-                </a:schemeClr>
-              </a:solidFill>
-              <a:ln>
-                <a:noFill/>
-              </a:ln>
-            </p:spPr>
-            <p:style>
-              <a:lnRef idx="2">
-                <a:schemeClr val="accent3">
-                  <a:shade val="50000"/>
-                </a:schemeClr>
-              </a:lnRef>
-              <a:fillRef idx="1">
-                <a:schemeClr val="accent3"/>
-              </a:fillRef>
-              <a:effectRef idx="0">
-                <a:schemeClr val="accent3"/>
-              </a:effectRef>
-              <a:fontRef idx="minor">
-                <a:schemeClr val="lt1"/>
-              </a:fontRef>
-            </p:style>
-            <p:txBody>
-              <a:bodyPr rtlCol="0" anchor="ctr"/>
-              <a:lstStyle/>
-              <a:p>
-                <a:pPr algn="ctr"/>
-                <a:r>
-                  <a:rPr lang="fr-FR" dirty="0" err="1">
-                    <a:solidFill>
-                      <a:schemeClr val="bg1">
-                        <a:lumMod val="75000"/>
-                      </a:schemeClr>
-                    </a:solidFill>
-                  </a:rPr>
-                  <a:t>username</a:t>
-                </a:r>
-                <a:endParaRPr lang="fr-FR" dirty="0">
-                  <a:solidFill>
-                    <a:schemeClr val="bg1">
-                      <a:lumMod val="75000"/>
-                    </a:schemeClr>
-                  </a:solidFill>
-                </a:endParaRPr>
-              </a:p>
-            </p:txBody>
-          </p:sp>
-          <p:sp>
-            <p:nvSpPr>
-              <p:cNvPr id="11" name="Rectangle 10">
-                <a:extLst>
-                  <a:ext uri="{FF2B5EF4-FFF2-40B4-BE49-F238E27FC236}">
-                    <a16:creationId xmlns:a16="http://schemas.microsoft.com/office/drawing/2014/main" id="{11C78053-9475-4A00-9265-EAF5B17FCCE6}"/>
-                  </a:ext>
-                </a:extLst>
-              </p:cNvPr>
-              <p:cNvSpPr/>
-              <p:nvPr/>
-            </p:nvSpPr>
-            <p:spPr>
-              <a:xfrm>
-                <a:off x="3148444" y="2567249"/>
-                <a:ext cx="2452254" cy="382385"/>
-              </a:xfrm>
-              <a:prstGeom prst="rect">
-                <a:avLst/>
-              </a:prstGeom>
-              <a:solidFill>
-                <a:schemeClr val="bg1">
-                  <a:lumMod val="95000"/>
-                </a:schemeClr>
-              </a:solidFill>
-              <a:ln>
-                <a:noFill/>
-              </a:ln>
-            </p:spPr>
-            <p:style>
-              <a:lnRef idx="2">
-                <a:schemeClr val="accent3">
-                  <a:shade val="50000"/>
-                </a:schemeClr>
-              </a:lnRef>
-              <a:fillRef idx="1">
-                <a:schemeClr val="accent3"/>
-              </a:fillRef>
-              <a:effectRef idx="0">
-                <a:schemeClr val="accent3"/>
-              </a:effectRef>
-              <a:fontRef idx="minor">
-                <a:schemeClr val="lt1"/>
-              </a:fontRef>
-            </p:style>
-            <p:txBody>
-              <a:bodyPr rtlCol="0" anchor="ctr"/>
-              <a:lstStyle/>
-              <a:p>
-                <a:pPr algn="ctr"/>
-                <a:r>
-                  <a:rPr lang="fr-FR" dirty="0" err="1">
-                    <a:solidFill>
-                      <a:schemeClr val="bg1">
-                        <a:lumMod val="75000"/>
-                      </a:schemeClr>
-                    </a:solidFill>
-                  </a:rPr>
-                  <a:t>password</a:t>
-                </a:r>
-                <a:endParaRPr lang="fr-FR" dirty="0">
-                  <a:solidFill>
-                    <a:schemeClr val="bg1">
-                      <a:lumMod val="75000"/>
-                    </a:schemeClr>
-                  </a:solidFill>
-                </a:endParaRPr>
-              </a:p>
-            </p:txBody>
-          </p:sp>
-          <p:sp>
-            <p:nvSpPr>
-              <p:cNvPr id="12" name="ZoneTexte 11">
-                <a:extLst>
-                  <a:ext uri="{FF2B5EF4-FFF2-40B4-BE49-F238E27FC236}">
-                    <a16:creationId xmlns:a16="http://schemas.microsoft.com/office/drawing/2014/main" id="{CA4504FF-DF9A-4E0D-8595-72D2456EF3FF}"/>
-                  </a:ext>
-                </a:extLst>
-              </p:cNvPr>
-              <p:cNvSpPr txBox="1"/>
-              <p:nvPr/>
-            </p:nvSpPr>
-            <p:spPr>
-              <a:xfrm>
-                <a:off x="3526673" y="1059873"/>
-                <a:ext cx="1695796" cy="382385"/>
-              </a:xfrm>
-              <a:prstGeom prst="rect">
-                <a:avLst/>
-              </a:prstGeom>
-              <a:noFill/>
-            </p:spPr>
-            <p:txBody>
-              <a:bodyPr wrap="square" rtlCol="0">
-                <a:spAutoFit/>
-              </a:bodyPr>
-              <a:lstStyle/>
-              <a:p>
-                <a:pPr algn="ctr"/>
-                <a:r>
-                  <a:rPr lang="fr-FR" dirty="0">
-                    <a:solidFill>
-                      <a:srgbClr val="3AB395"/>
-                    </a:solidFill>
-                  </a:rPr>
-                  <a:t>Connexion</a:t>
-                </a:r>
-              </a:p>
-            </p:txBody>
-          </p:sp>
-          <p:pic>
-            <p:nvPicPr>
-              <p:cNvPr id="14" name="Graphique 13" descr="Utilisateur contour">
-                <a:extLst>
-                  <a:ext uri="{FF2B5EF4-FFF2-40B4-BE49-F238E27FC236}">
-                    <a16:creationId xmlns:a16="http://schemas.microsoft.com/office/drawing/2014/main" id="{0FA89914-0255-4AA8-AAA7-D443F0799031}"/>
-                  </a:ext>
-                </a:extLst>
-              </p:cNvPr>
-              <p:cNvPicPr>
-                <a:picLocks noChangeAspect="1"/>
-              </p:cNvPicPr>
-              <p:nvPr/>
-            </p:nvPicPr>
-            <p:blipFill>
-              <a:blip r:embed="rId2">
-                <a:extLst>
-                  <a:ext uri="{28A0092B-C50C-407E-A947-70E740481C1C}">
-                    <a14:useLocalDpi xmlns:a14="http://schemas.microsoft.com/office/drawing/2010/main" val="0"/>
-                  </a:ext>
-                  <a:ext uri="{96DAC541-7B7A-43D3-8B79-37D633B846F1}">
-                    <asvg:svgBlip xmlns:asvg="http://schemas.microsoft.com/office/drawing/2016/SVG/main" r:embed="rId3"/>
-                  </a:ext>
-                </a:extLst>
-              </a:blip>
-              <a:stretch>
-                <a:fillRect/>
-              </a:stretch>
-            </p:blipFill>
-            <p:spPr>
-              <a:xfrm>
-                <a:off x="3576442" y="1979868"/>
-                <a:ext cx="180000" cy="180000"/>
-              </a:xfrm>
-              <a:prstGeom prst="rect">
-                <a:avLst/>
-              </a:prstGeom>
-            </p:spPr>
-          </p:pic>
-          <p:pic>
-            <p:nvPicPr>
-              <p:cNvPr id="16" name="Graphique 15" descr="Verrou contour">
-                <a:extLst>
-                  <a:ext uri="{FF2B5EF4-FFF2-40B4-BE49-F238E27FC236}">
-                    <a16:creationId xmlns:a16="http://schemas.microsoft.com/office/drawing/2014/main" id="{B42C5914-F0BC-4B92-BD90-4567652CC303}"/>
-                  </a:ext>
-                </a:extLst>
-              </p:cNvPr>
-              <p:cNvPicPr>
-                <a:picLocks noChangeAspect="1"/>
-              </p:cNvPicPr>
-              <p:nvPr/>
-            </p:nvPicPr>
-            <p:blipFill>
-              <a:blip r:embed="rId4">
-                <a:extLst>
-                  <a:ext uri="{28A0092B-C50C-407E-A947-70E740481C1C}">
-                    <a14:useLocalDpi xmlns:a14="http://schemas.microsoft.com/office/drawing/2010/main" val="0"/>
-                  </a:ext>
-                  <a:ext uri="{96DAC541-7B7A-43D3-8B79-37D633B846F1}">
-                    <asvg:svgBlip xmlns:asvg="http://schemas.microsoft.com/office/drawing/2016/SVG/main" r:embed="rId5"/>
-                  </a:ext>
-                </a:extLst>
-              </a:blip>
-              <a:stretch>
-                <a:fillRect/>
-              </a:stretch>
-            </p:blipFill>
-            <p:spPr>
-              <a:xfrm>
-                <a:off x="3576442" y="2672594"/>
-                <a:ext cx="180000" cy="180000"/>
-              </a:xfrm>
-              <a:prstGeom prst="rect">
-                <a:avLst/>
-              </a:prstGeom>
-            </p:spPr>
-          </p:pic>
-        </p:grpSp>
-        <p:grpSp>
-          <p:nvGrpSpPr>
-            <p:cNvPr id="39" name="Groupe 38">
-              <a:extLst>
-                <a:ext uri="{FF2B5EF4-FFF2-40B4-BE49-F238E27FC236}">
-                  <a16:creationId xmlns:a16="http://schemas.microsoft.com/office/drawing/2014/main" id="{0B2ED70E-15B8-4D30-8ECD-98FC9B8AEEBD}"/>
-                </a:ext>
-              </a:extLst>
-            </p:cNvPr>
-            <p:cNvGrpSpPr/>
-            <p:nvPr/>
-          </p:nvGrpSpPr>
-          <p:grpSpPr>
-            <a:xfrm>
-              <a:off x="6129256" y="793864"/>
-              <a:ext cx="3442855" cy="3466408"/>
-              <a:chOff x="6145881" y="527857"/>
-              <a:chExt cx="3442855" cy="3466408"/>
-            </a:xfrm>
-          </p:grpSpPr>
-          <p:grpSp>
-            <p:nvGrpSpPr>
-              <p:cNvPr id="22" name="Groupe 21">
-                <a:extLst>
-                  <a:ext uri="{FF2B5EF4-FFF2-40B4-BE49-F238E27FC236}">
-                    <a16:creationId xmlns:a16="http://schemas.microsoft.com/office/drawing/2014/main" id="{0995A93D-58E1-4CD2-8E9D-916A87AFD514}"/>
+                    <a16:creationId xmlns:a16="http://schemas.microsoft.com/office/drawing/2014/main" id="{3DDBB08A-3545-42FD-A31E-9735D388A1EC}"/>
                   </a:ext>
                 </a:extLst>
               </p:cNvPr>
@@ -4361,7 +4030,7 @@
             </p:nvGrpSpPr>
             <p:grpSpPr>
               <a:xfrm>
-                <a:off x="6145881" y="527857"/>
+                <a:off x="2586641" y="793864"/>
                 <a:ext cx="3442855" cy="3466408"/>
                 <a:chOff x="2653144" y="527857"/>
                 <a:chExt cx="3442855" cy="3466408"/>
@@ -4369,10 +4038,10 @@
             </p:grpSpPr>
             <p:sp>
               <p:nvSpPr>
-                <p:cNvPr id="23" name="Rectangle : coins arrondis 22">
+                <p:cNvPr id="8" name="Rectangle : coins arrondis 7">
                   <a:extLst>
                     <a:ext uri="{FF2B5EF4-FFF2-40B4-BE49-F238E27FC236}">
-                      <a16:creationId xmlns:a16="http://schemas.microsoft.com/office/drawing/2014/main" id="{833CB771-3743-4F60-9072-D80360A6E38C}"/>
+                      <a16:creationId xmlns:a16="http://schemas.microsoft.com/office/drawing/2014/main" id="{A5557395-889E-4AB5-9EA2-FB609C6B2656}"/>
                     </a:ext>
                   </a:extLst>
                 </p:cNvPr>
@@ -4393,6 +4062,13 @@
                 <a:ln>
                   <a:noFill/>
                 </a:ln>
+                <a:effectLst>
+                  <a:outerShdw blurRad="63500" sx="102000" sy="102000" algn="ctr" rotWithShape="0">
+                    <a:prstClr val="black">
+                      <a:alpha val="40000"/>
+                    </a:prstClr>
+                  </a:outerShdw>
+                </a:effectLst>
               </p:spPr>
               <p:style>
                 <a:lnRef idx="2">
@@ -4421,10 +4097,10 @@
             </p:sp>
             <p:sp>
               <p:nvSpPr>
-                <p:cNvPr id="24" name="Rectangle 23">
+                <p:cNvPr id="9" name="Rectangle 8">
                   <a:extLst>
                     <a:ext uri="{FF2B5EF4-FFF2-40B4-BE49-F238E27FC236}">
-                      <a16:creationId xmlns:a16="http://schemas.microsoft.com/office/drawing/2014/main" id="{B7F65341-5CE9-418F-B7E7-C4AD72EACE78}"/>
+                      <a16:creationId xmlns:a16="http://schemas.microsoft.com/office/drawing/2014/main" id="{3A5E93C8-3108-4120-8AC8-88957A3FCA17}"/>
                     </a:ext>
                   </a:extLst>
                 </p:cNvPr>
@@ -4433,7 +4109,7 @@
               </p:nvSpPr>
               <p:spPr>
                 <a:xfrm>
-                  <a:off x="3148444" y="1547603"/>
+                  <a:off x="3125376" y="1727850"/>
                   <a:ext cx="2452254" cy="382385"/>
                 </a:xfrm>
                 <a:prstGeom prst="rect">
@@ -4447,6 +4123,13 @@
                 <a:ln>
                   <a:noFill/>
                 </a:ln>
+                <a:effectLst>
+                  <a:innerShdw blurRad="63500">
+                    <a:prstClr val="black">
+                      <a:alpha val="50000"/>
+                    </a:prstClr>
+                  </a:innerShdw>
+                </a:effectLst>
               </p:spPr>
               <p:style>
                 <a:lnRef idx="2">
@@ -4491,10 +4174,10 @@
             </p:sp>
             <p:sp>
               <p:nvSpPr>
-                <p:cNvPr id="25" name="Rectangle 24">
+                <p:cNvPr id="11" name="Rectangle 10">
                   <a:extLst>
                     <a:ext uri="{FF2B5EF4-FFF2-40B4-BE49-F238E27FC236}">
-                      <a16:creationId xmlns:a16="http://schemas.microsoft.com/office/drawing/2014/main" id="{EDC82917-4936-4CA4-B139-92C38D664252}"/>
+                      <a16:creationId xmlns:a16="http://schemas.microsoft.com/office/drawing/2014/main" id="{11C78053-9475-4A00-9265-EAF5B17FCCE6}"/>
                     </a:ext>
                   </a:extLst>
                 </p:cNvPr>
@@ -4503,7 +4186,7 @@
               </p:nvSpPr>
               <p:spPr>
                 <a:xfrm>
-                  <a:off x="3148444" y="1984020"/>
+                  <a:off x="3125376" y="2416423"/>
                   <a:ext cx="2452254" cy="382385"/>
                 </a:xfrm>
                 <a:prstGeom prst="rect">
@@ -4517,6 +4200,13 @@
                 <a:ln>
                   <a:noFill/>
                 </a:ln>
+                <a:effectLst>
+                  <a:innerShdw blurRad="63500">
+                    <a:prstClr val="black">
+                      <a:alpha val="50000"/>
+                    </a:prstClr>
+                  </a:innerShdw>
+                </a:effectLst>
               </p:spPr>
               <p:style>
                 <a:lnRef idx="2">
@@ -4561,10 +4251,10 @@
             </p:sp>
             <p:sp>
               <p:nvSpPr>
-                <p:cNvPr id="26" name="ZoneTexte 25">
+                <p:cNvPr id="12" name="ZoneTexte 11">
                   <a:extLst>
                     <a:ext uri="{FF2B5EF4-FFF2-40B4-BE49-F238E27FC236}">
-                      <a16:creationId xmlns:a16="http://schemas.microsoft.com/office/drawing/2014/main" id="{3B4838B2-A3E0-4F8D-A697-C077D0933615}"/>
+                      <a16:creationId xmlns:a16="http://schemas.microsoft.com/office/drawing/2014/main" id="{CA4504FF-DF9A-4E0D-8595-72D2456EF3FF}"/>
                     </a:ext>
                   </a:extLst>
                 </p:cNvPr>
@@ -4573,7 +4263,7 @@
               </p:nvSpPr>
               <p:spPr>
                 <a:xfrm>
-                  <a:off x="3526673" y="1059873"/>
+                  <a:off x="3503605" y="734579"/>
                   <a:ext cx="1695796" cy="382385"/>
                 </a:xfrm>
                 <a:prstGeom prst="rect">
@@ -4594,17 +4284,17 @@
                         <a:srgbClr val="3AB395"/>
                       </a:solidFill>
                     </a:rPr>
-                    <a:t>Inscription</a:t>
+                    <a:t>Connexion</a:t>
                   </a:r>
                 </a:p>
               </p:txBody>
             </p:sp>
             <p:pic>
               <p:nvPicPr>
-                <p:cNvPr id="27" name="Graphique 26" descr="Utilisateur contour">
+                <p:cNvPr id="14" name="Graphique 13" descr="Utilisateur contour">
                   <a:extLst>
                     <a:ext uri="{FF2B5EF4-FFF2-40B4-BE49-F238E27FC236}">
-                      <a16:creationId xmlns:a16="http://schemas.microsoft.com/office/drawing/2014/main" id="{FE214C85-E928-4F1C-A42A-9EE18A307797}"/>
+                      <a16:creationId xmlns:a16="http://schemas.microsoft.com/office/drawing/2014/main" id="{0FA89914-0255-4AA8-AAA7-D443F0799031}"/>
                     </a:ext>
                   </a:extLst>
                 </p:cNvPr>
@@ -4630,7 +4320,7 @@
               </p:blipFill>
               <p:spPr>
                 <a:xfrm>
-                  <a:off x="3576442" y="1648795"/>
+                  <a:off x="3553374" y="1829042"/>
                   <a:ext cx="180000" cy="180000"/>
                 </a:xfrm>
                 <a:prstGeom prst="rect">
@@ -4640,10 +4330,10 @@
             </p:pic>
             <p:pic>
               <p:nvPicPr>
-                <p:cNvPr id="28" name="Graphique 27" descr="Verrou contour">
+                <p:cNvPr id="16" name="Graphique 15" descr="Verrou contour">
                   <a:extLst>
                     <a:ext uri="{FF2B5EF4-FFF2-40B4-BE49-F238E27FC236}">
-                      <a16:creationId xmlns:a16="http://schemas.microsoft.com/office/drawing/2014/main" id="{D6504AD9-83DD-42D7-A11F-C670F811CC7E}"/>
+                      <a16:creationId xmlns:a16="http://schemas.microsoft.com/office/drawing/2014/main" id="{B42C5914-F0BC-4B92-BD90-4567652CC303}"/>
                     </a:ext>
                   </a:extLst>
                 </p:cNvPr>
@@ -4669,7 +4359,7 @@
               </p:blipFill>
               <p:spPr>
                 <a:xfrm>
-                  <a:off x="3576442" y="2089365"/>
+                  <a:off x="3553374" y="2521768"/>
                   <a:ext cx="180000" cy="180000"/>
                 </a:xfrm>
                 <a:prstGeom prst="rect">
@@ -4678,329 +4368,823 @@
               </p:spPr>
             </p:pic>
           </p:grpSp>
-          <p:sp>
-            <p:nvSpPr>
-              <p:cNvPr id="29" name="Rectangle 28">
+          <p:grpSp>
+            <p:nvGrpSpPr>
+              <p:cNvPr id="39" name="Groupe 38">
                 <a:extLst>
                   <a:ext uri="{FF2B5EF4-FFF2-40B4-BE49-F238E27FC236}">
-                    <a16:creationId xmlns:a16="http://schemas.microsoft.com/office/drawing/2014/main" id="{65FE2278-E684-4E6A-A03E-1CDE52BC2EF9}"/>
+                    <a16:creationId xmlns:a16="http://schemas.microsoft.com/office/drawing/2014/main" id="{0B2ED70E-15B8-4D30-8ECD-98FC9B8AEEBD}"/>
                   </a:ext>
                 </a:extLst>
               </p:cNvPr>
-              <p:cNvSpPr/>
+              <p:cNvGrpSpPr/>
+              <p:nvPr/>
+            </p:nvGrpSpPr>
+            <p:grpSpPr>
+              <a:xfrm>
+                <a:off x="6129256" y="793864"/>
+                <a:ext cx="3442855" cy="3466408"/>
+                <a:chOff x="6145881" y="527857"/>
+                <a:chExt cx="3442855" cy="3466408"/>
+              </a:xfrm>
+            </p:grpSpPr>
+            <p:grpSp>
+              <p:nvGrpSpPr>
+                <p:cNvPr id="22" name="Groupe 21">
+                  <a:extLst>
+                    <a:ext uri="{FF2B5EF4-FFF2-40B4-BE49-F238E27FC236}">
+                      <a16:creationId xmlns:a16="http://schemas.microsoft.com/office/drawing/2014/main" id="{0995A93D-58E1-4CD2-8E9D-916A87AFD514}"/>
+                    </a:ext>
+                  </a:extLst>
+                </p:cNvPr>
+                <p:cNvGrpSpPr/>
+                <p:nvPr/>
+              </p:nvGrpSpPr>
+              <p:grpSpPr>
+                <a:xfrm>
+                  <a:off x="6145881" y="527857"/>
+                  <a:ext cx="3442855" cy="3466408"/>
+                  <a:chOff x="2653144" y="527857"/>
+                  <a:chExt cx="3442855" cy="3466408"/>
+                </a:xfrm>
+              </p:grpSpPr>
+              <p:sp>
+                <p:nvSpPr>
+                  <p:cNvPr id="23" name="Rectangle : coins arrondis 22">
+                    <a:extLst>
+                      <a:ext uri="{FF2B5EF4-FFF2-40B4-BE49-F238E27FC236}">
+                        <a16:creationId xmlns:a16="http://schemas.microsoft.com/office/drawing/2014/main" id="{833CB771-3743-4F60-9072-D80360A6E38C}"/>
+                      </a:ext>
+                    </a:extLst>
+                  </p:cNvPr>
+                  <p:cNvSpPr/>
+                  <p:nvPr/>
+                </p:nvSpPr>
+                <p:spPr>
+                  <a:xfrm>
+                    <a:off x="2653144" y="527857"/>
+                    <a:ext cx="3442855" cy="3466408"/>
+                  </a:xfrm>
+                  <a:prstGeom prst="roundRect">
+                    <a:avLst/>
+                  </a:prstGeom>
+                  <a:solidFill>
+                    <a:schemeClr val="bg1"/>
+                  </a:solidFill>
+                  <a:ln>
+                    <a:noFill/>
+                  </a:ln>
+                  <a:effectLst>
+                    <a:outerShdw blurRad="63500" sx="102000" sy="102000" algn="ctr" rotWithShape="0">
+                      <a:prstClr val="black">
+                        <a:alpha val="40000"/>
+                      </a:prstClr>
+                    </a:outerShdw>
+                  </a:effectLst>
+                </p:spPr>
+                <p:style>
+                  <a:lnRef idx="2">
+                    <a:schemeClr val="accent1">
+                      <a:shade val="50000"/>
+                    </a:schemeClr>
+                  </a:lnRef>
+                  <a:fillRef idx="1">
+                    <a:schemeClr val="accent1"/>
+                  </a:fillRef>
+                  <a:effectRef idx="0">
+                    <a:schemeClr val="accent1"/>
+                  </a:effectRef>
+                  <a:fontRef idx="minor">
+                    <a:schemeClr val="lt1"/>
+                  </a:fontRef>
+                </p:style>
+                <p:txBody>
+                  <a:bodyPr rtlCol="0" anchor="ctr"/>
+                  <a:lstStyle/>
+                  <a:p>
+                    <a:pPr algn="ctr"/>
+                    <a:endParaRPr lang="fr-FR"/>
+                  </a:p>
+                </p:txBody>
+              </p:sp>
+              <p:sp>
+                <p:nvSpPr>
+                  <p:cNvPr id="24" name="Rectangle 23">
+                    <a:extLst>
+                      <a:ext uri="{FF2B5EF4-FFF2-40B4-BE49-F238E27FC236}">
+                        <a16:creationId xmlns:a16="http://schemas.microsoft.com/office/drawing/2014/main" id="{B7F65341-5CE9-418F-B7E7-C4AD72EACE78}"/>
+                      </a:ext>
+                    </a:extLst>
+                  </p:cNvPr>
+                  <p:cNvSpPr/>
+                  <p:nvPr/>
+                </p:nvSpPr>
+                <p:spPr>
+                  <a:xfrm>
+                    <a:off x="3204761" y="1096182"/>
+                    <a:ext cx="2452254" cy="382385"/>
+                  </a:xfrm>
+                  <a:prstGeom prst="rect">
+                    <a:avLst/>
+                  </a:prstGeom>
+                  <a:solidFill>
+                    <a:schemeClr val="bg1">
+                      <a:lumMod val="95000"/>
+                    </a:schemeClr>
+                  </a:solidFill>
+                  <a:ln>
+                    <a:noFill/>
+                  </a:ln>
+                  <a:effectLst>
+                    <a:innerShdw blurRad="63500">
+                      <a:prstClr val="black">
+                        <a:alpha val="50000"/>
+                      </a:prstClr>
+                    </a:innerShdw>
+                  </a:effectLst>
+                </p:spPr>
+                <p:style>
+                  <a:lnRef idx="2">
+                    <a:schemeClr val="accent3">
+                      <a:shade val="50000"/>
+                    </a:schemeClr>
+                  </a:lnRef>
+                  <a:fillRef idx="1">
+                    <a:schemeClr val="accent3"/>
+                  </a:fillRef>
+                  <a:effectRef idx="0">
+                    <a:schemeClr val="accent3"/>
+                  </a:effectRef>
+                  <a:fontRef idx="minor">
+                    <a:schemeClr val="lt1"/>
+                  </a:fontRef>
+                </p:style>
+                <p:txBody>
+                  <a:bodyPr rtlCol="0" anchor="ctr"/>
+                  <a:lstStyle/>
+                  <a:p>
+                    <a:pPr algn="ctr"/>
+                    <a:r>
+                      <a:rPr lang="fr-FR" dirty="0" err="1">
+                        <a:solidFill>
+                          <a:schemeClr val="bg1">
+                            <a:lumMod val="75000"/>
+                          </a:schemeClr>
+                        </a:solidFill>
+                      </a:rPr>
+                      <a:t>username</a:t>
+                    </a:r>
+                    <a:endParaRPr lang="fr-FR" dirty="0">
+                      <a:solidFill>
+                        <a:schemeClr val="bg1">
+                          <a:lumMod val="75000"/>
+                        </a:schemeClr>
+                      </a:solidFill>
+                    </a:endParaRPr>
+                  </a:p>
+                </p:txBody>
+              </p:sp>
+              <p:sp>
+                <p:nvSpPr>
+                  <p:cNvPr id="25" name="Rectangle 24">
+                    <a:extLst>
+                      <a:ext uri="{FF2B5EF4-FFF2-40B4-BE49-F238E27FC236}">
+                        <a16:creationId xmlns:a16="http://schemas.microsoft.com/office/drawing/2014/main" id="{EDC82917-4936-4CA4-B139-92C38D664252}"/>
+                      </a:ext>
+                    </a:extLst>
+                  </p:cNvPr>
+                  <p:cNvSpPr/>
+                  <p:nvPr/>
+                </p:nvSpPr>
+                <p:spPr>
+                  <a:xfrm>
+                    <a:off x="3204761" y="1532600"/>
+                    <a:ext cx="2452254" cy="382385"/>
+                  </a:xfrm>
+                  <a:prstGeom prst="rect">
+                    <a:avLst/>
+                  </a:prstGeom>
+                  <a:solidFill>
+                    <a:schemeClr val="bg1">
+                      <a:lumMod val="95000"/>
+                    </a:schemeClr>
+                  </a:solidFill>
+                  <a:ln>
+                    <a:noFill/>
+                  </a:ln>
+                  <a:effectLst>
+                    <a:innerShdw blurRad="63500">
+                      <a:prstClr val="black">
+                        <a:alpha val="50000"/>
+                      </a:prstClr>
+                    </a:innerShdw>
+                  </a:effectLst>
+                </p:spPr>
+                <p:style>
+                  <a:lnRef idx="2">
+                    <a:schemeClr val="accent3">
+                      <a:shade val="50000"/>
+                    </a:schemeClr>
+                  </a:lnRef>
+                  <a:fillRef idx="1">
+                    <a:schemeClr val="accent3"/>
+                  </a:fillRef>
+                  <a:effectRef idx="0">
+                    <a:schemeClr val="accent3"/>
+                  </a:effectRef>
+                  <a:fontRef idx="minor">
+                    <a:schemeClr val="lt1"/>
+                  </a:fontRef>
+                </p:style>
+                <p:txBody>
+                  <a:bodyPr rtlCol="0" anchor="ctr"/>
+                  <a:lstStyle/>
+                  <a:p>
+                    <a:pPr algn="ctr"/>
+                    <a:r>
+                      <a:rPr lang="fr-FR" dirty="0" err="1">
+                        <a:solidFill>
+                          <a:schemeClr val="bg1">
+                            <a:lumMod val="75000"/>
+                          </a:schemeClr>
+                        </a:solidFill>
+                      </a:rPr>
+                      <a:t>password</a:t>
+                    </a:r>
+                    <a:endParaRPr lang="fr-FR" dirty="0">
+                      <a:solidFill>
+                        <a:schemeClr val="bg1">
+                          <a:lumMod val="75000"/>
+                        </a:schemeClr>
+                      </a:solidFill>
+                    </a:endParaRPr>
+                  </a:p>
+                </p:txBody>
+              </p:sp>
+              <p:sp>
+                <p:nvSpPr>
+                  <p:cNvPr id="26" name="ZoneTexte 25">
+                    <a:extLst>
+                      <a:ext uri="{FF2B5EF4-FFF2-40B4-BE49-F238E27FC236}">
+                        <a16:creationId xmlns:a16="http://schemas.microsoft.com/office/drawing/2014/main" id="{3B4838B2-A3E0-4F8D-A697-C077D0933615}"/>
+                      </a:ext>
+                    </a:extLst>
+                  </p:cNvPr>
+                  <p:cNvSpPr txBox="1"/>
+                  <p:nvPr/>
+                </p:nvSpPr>
+                <p:spPr>
+                  <a:xfrm>
+                    <a:off x="3526673" y="734579"/>
+                    <a:ext cx="1695796" cy="382385"/>
+                  </a:xfrm>
+                  <a:prstGeom prst="rect">
+                    <a:avLst/>
+                  </a:prstGeom>
+                  <a:noFill/>
+                </p:spPr>
+                <p:txBody>
+                  <a:bodyPr wrap="square" rtlCol="0">
+                    <a:spAutoFit/>
+                  </a:bodyPr>
+                  <a:lstStyle/>
+                  <a:p>
+                    <a:pPr algn="ctr"/>
+                    <a:r>
+                      <a:rPr lang="fr-FR" dirty="0">
+                        <a:solidFill>
+                          <a:srgbClr val="3AB395"/>
+                        </a:solidFill>
+                      </a:rPr>
+                      <a:t>Inscription</a:t>
+                    </a:r>
+                  </a:p>
+                </p:txBody>
+              </p:sp>
+              <p:pic>
+                <p:nvPicPr>
+                  <p:cNvPr id="27" name="Graphique 26" descr="Utilisateur contour">
+                    <a:extLst>
+                      <a:ext uri="{FF2B5EF4-FFF2-40B4-BE49-F238E27FC236}">
+                        <a16:creationId xmlns:a16="http://schemas.microsoft.com/office/drawing/2014/main" id="{FE214C85-E928-4F1C-A42A-9EE18A307797}"/>
+                      </a:ext>
+                    </a:extLst>
+                  </p:cNvPr>
+                  <p:cNvPicPr>
+                    <a:picLocks noChangeAspect="1"/>
+                  </p:cNvPicPr>
+                  <p:nvPr/>
+                </p:nvPicPr>
+                <p:blipFill>
+                  <a:blip r:embed="rId2">
+                    <a:extLst>
+                      <a:ext uri="{28A0092B-C50C-407E-A947-70E740481C1C}">
+                        <a14:useLocalDpi xmlns:a14="http://schemas.microsoft.com/office/drawing/2010/main" val="0"/>
+                      </a:ext>
+                      <a:ext uri="{96DAC541-7B7A-43D3-8B79-37D633B846F1}">
+                        <asvg:svgBlip xmlns:asvg="http://schemas.microsoft.com/office/drawing/2016/SVG/main" r:embed="rId3"/>
+                      </a:ext>
+                    </a:extLst>
+                  </a:blip>
+                  <a:stretch>
+                    <a:fillRect/>
+                  </a:stretch>
+                </p:blipFill>
+                <p:spPr>
+                  <a:xfrm>
+                    <a:off x="3632759" y="1197374"/>
+                    <a:ext cx="180000" cy="180000"/>
+                  </a:xfrm>
+                  <a:prstGeom prst="rect">
+                    <a:avLst/>
+                  </a:prstGeom>
+                </p:spPr>
+              </p:pic>
+              <p:pic>
+                <p:nvPicPr>
+                  <p:cNvPr id="28" name="Graphique 27" descr="Verrou contour">
+                    <a:extLst>
+                      <a:ext uri="{FF2B5EF4-FFF2-40B4-BE49-F238E27FC236}">
+                        <a16:creationId xmlns:a16="http://schemas.microsoft.com/office/drawing/2014/main" id="{D6504AD9-83DD-42D7-A11F-C670F811CC7E}"/>
+                      </a:ext>
+                    </a:extLst>
+                  </p:cNvPr>
+                  <p:cNvPicPr>
+                    <a:picLocks noChangeAspect="1"/>
+                  </p:cNvPicPr>
+                  <p:nvPr/>
+                </p:nvPicPr>
+                <p:blipFill>
+                  <a:blip r:embed="rId4">
+                    <a:extLst>
+                      <a:ext uri="{28A0092B-C50C-407E-A947-70E740481C1C}">
+                        <a14:useLocalDpi xmlns:a14="http://schemas.microsoft.com/office/drawing/2010/main" val="0"/>
+                      </a:ext>
+                      <a:ext uri="{96DAC541-7B7A-43D3-8B79-37D633B846F1}">
+                        <asvg:svgBlip xmlns:asvg="http://schemas.microsoft.com/office/drawing/2016/SVG/main" r:embed="rId5"/>
+                      </a:ext>
+                    </a:extLst>
+                  </a:blip>
+                  <a:stretch>
+                    <a:fillRect/>
+                  </a:stretch>
+                </p:blipFill>
+                <p:spPr>
+                  <a:xfrm>
+                    <a:off x="3632759" y="1637944"/>
+                    <a:ext cx="180000" cy="180000"/>
+                  </a:xfrm>
+                  <a:prstGeom prst="rect">
+                    <a:avLst/>
+                  </a:prstGeom>
+                </p:spPr>
+              </p:pic>
+            </p:grpSp>
+            <p:sp>
+              <p:nvSpPr>
+                <p:cNvPr id="29" name="Rectangle 28">
+                  <a:extLst>
+                    <a:ext uri="{FF2B5EF4-FFF2-40B4-BE49-F238E27FC236}">
+                      <a16:creationId xmlns:a16="http://schemas.microsoft.com/office/drawing/2014/main" id="{65FE2278-E684-4E6A-A03E-1CDE52BC2EF9}"/>
+                    </a:ext>
+                  </a:extLst>
+                </p:cNvPr>
+                <p:cNvSpPr/>
+                <p:nvPr/>
+              </p:nvSpPr>
+              <p:spPr>
+                <a:xfrm>
+                  <a:off x="6697498" y="1965586"/>
+                  <a:ext cx="2452254" cy="382385"/>
+                </a:xfrm>
+                <a:prstGeom prst="rect">
+                  <a:avLst/>
+                </a:prstGeom>
+                <a:solidFill>
+                  <a:schemeClr val="bg1">
+                    <a:lumMod val="95000"/>
+                  </a:schemeClr>
+                </a:solidFill>
+                <a:ln>
+                  <a:noFill/>
+                </a:ln>
+                <a:effectLst>
+                  <a:innerShdw blurRad="63500">
+                    <a:prstClr val="black">
+                      <a:alpha val="50000"/>
+                    </a:prstClr>
+                  </a:innerShdw>
+                </a:effectLst>
+              </p:spPr>
+              <p:style>
+                <a:lnRef idx="2">
+                  <a:schemeClr val="accent3">
+                    <a:shade val="50000"/>
+                  </a:schemeClr>
+                </a:lnRef>
+                <a:fillRef idx="1">
+                  <a:schemeClr val="accent3"/>
+                </a:fillRef>
+                <a:effectRef idx="0">
+                  <a:schemeClr val="accent3"/>
+                </a:effectRef>
+                <a:fontRef idx="minor">
+                  <a:schemeClr val="lt1"/>
+                </a:fontRef>
+              </p:style>
+              <p:txBody>
+                <a:bodyPr rtlCol="0" anchor="ctr"/>
+                <a:lstStyle/>
+                <a:p>
+                  <a:pPr algn="ctr"/>
+                  <a:r>
+                    <a:rPr lang="fr-FR" dirty="0">
+                      <a:solidFill>
+                        <a:schemeClr val="bg1">
+                          <a:lumMod val="75000"/>
+                        </a:schemeClr>
+                      </a:solidFill>
+                    </a:rPr>
+                    <a:t>email</a:t>
+                  </a:r>
+                </a:p>
+              </p:txBody>
+            </p:sp>
+            <p:pic>
+              <p:nvPicPr>
+                <p:cNvPr id="32" name="Graphique 31" descr="Adresse de courrier contour">
+                  <a:extLst>
+                    <a:ext uri="{FF2B5EF4-FFF2-40B4-BE49-F238E27FC236}">
+                      <a16:creationId xmlns:a16="http://schemas.microsoft.com/office/drawing/2014/main" id="{883744CB-5781-4F9D-BDA9-7A7E6FC39FF5}"/>
+                    </a:ext>
+                  </a:extLst>
+                </p:cNvPr>
+                <p:cNvPicPr>
+                  <a:picLocks noChangeAspect="1"/>
+                </p:cNvPicPr>
+                <p:nvPr/>
+              </p:nvPicPr>
+              <p:blipFill>
+                <a:blip r:embed="rId6">
+                  <a:extLst>
+                    <a:ext uri="{28A0092B-C50C-407E-A947-70E740481C1C}">
+                      <a14:useLocalDpi xmlns:a14="http://schemas.microsoft.com/office/drawing/2010/main" val="0"/>
+                    </a:ext>
+                    <a:ext uri="{96DAC541-7B7A-43D3-8B79-37D633B846F1}">
+                      <asvg:svgBlip xmlns:asvg="http://schemas.microsoft.com/office/drawing/2016/SVG/main" r:embed="rId7"/>
+                    </a:ext>
+                  </a:extLst>
+                </a:blip>
+                <a:stretch>
+                  <a:fillRect/>
+                </a:stretch>
+              </p:blipFill>
+              <p:spPr>
+                <a:xfrm>
+                  <a:off x="7125496" y="2066778"/>
+                  <a:ext cx="180000" cy="180000"/>
+                </a:xfrm>
+                <a:prstGeom prst="rect">
+                  <a:avLst/>
+                </a:prstGeom>
+              </p:spPr>
+            </p:pic>
+            <p:sp>
+              <p:nvSpPr>
+                <p:cNvPr id="33" name="Rectangle 32">
+                  <a:extLst>
+                    <a:ext uri="{FF2B5EF4-FFF2-40B4-BE49-F238E27FC236}">
+                      <a16:creationId xmlns:a16="http://schemas.microsoft.com/office/drawing/2014/main" id="{B3B0BE9C-C7B5-4BE1-827F-E11BB83E2D54}"/>
+                    </a:ext>
+                  </a:extLst>
+                </p:cNvPr>
+                <p:cNvSpPr/>
+                <p:nvPr/>
+              </p:nvSpPr>
+              <p:spPr>
+                <a:xfrm>
+                  <a:off x="6697498" y="2407598"/>
+                  <a:ext cx="2452254" cy="382385"/>
+                </a:xfrm>
+                <a:prstGeom prst="rect">
+                  <a:avLst/>
+                </a:prstGeom>
+                <a:solidFill>
+                  <a:schemeClr val="bg1">
+                    <a:lumMod val="95000"/>
+                  </a:schemeClr>
+                </a:solidFill>
+                <a:ln>
+                  <a:noFill/>
+                </a:ln>
+                <a:effectLst>
+                  <a:innerShdw blurRad="63500">
+                    <a:prstClr val="black">
+                      <a:alpha val="50000"/>
+                    </a:prstClr>
+                  </a:innerShdw>
+                </a:effectLst>
+              </p:spPr>
+              <p:style>
+                <a:lnRef idx="2">
+                  <a:schemeClr val="accent3">
+                    <a:shade val="50000"/>
+                  </a:schemeClr>
+                </a:lnRef>
+                <a:fillRef idx="1">
+                  <a:schemeClr val="accent3"/>
+                </a:fillRef>
+                <a:effectRef idx="0">
+                  <a:schemeClr val="accent3"/>
+                </a:effectRef>
+                <a:fontRef idx="minor">
+                  <a:schemeClr val="lt1"/>
+                </a:fontRef>
+              </p:style>
+              <p:txBody>
+                <a:bodyPr rtlCol="0" anchor="ctr"/>
+                <a:lstStyle/>
+                <a:p>
+                  <a:pPr algn="ctr"/>
+                  <a:r>
+                    <a:rPr lang="fr-FR" dirty="0">
+                      <a:solidFill>
+                        <a:schemeClr val="bg1">
+                          <a:lumMod val="75000"/>
+                        </a:schemeClr>
+                      </a:solidFill>
+                    </a:rPr>
+                    <a:t>niveau</a:t>
+                  </a:r>
+                </a:p>
+              </p:txBody>
+            </p:sp>
+            <p:pic>
+              <p:nvPicPr>
+                <p:cNvPr id="36" name="Graphique 35" descr="Classe contour">
+                  <a:extLst>
+                    <a:ext uri="{FF2B5EF4-FFF2-40B4-BE49-F238E27FC236}">
+                      <a16:creationId xmlns:a16="http://schemas.microsoft.com/office/drawing/2014/main" id="{D860043F-B0C0-43B4-97EB-A5C5837C9CBD}"/>
+                    </a:ext>
+                  </a:extLst>
+                </p:cNvPr>
+                <p:cNvPicPr>
+                  <a:picLocks noChangeAspect="1"/>
+                </p:cNvPicPr>
+                <p:nvPr/>
+              </p:nvPicPr>
+              <p:blipFill>
+                <a:blip r:embed="rId8">
+                  <a:extLst>
+                    <a:ext uri="{28A0092B-C50C-407E-A947-70E740481C1C}">
+                      <a14:useLocalDpi xmlns:a14="http://schemas.microsoft.com/office/drawing/2010/main" val="0"/>
+                    </a:ext>
+                    <a:ext uri="{96DAC541-7B7A-43D3-8B79-37D633B846F1}">
+                      <asvg:svgBlip xmlns:asvg="http://schemas.microsoft.com/office/drawing/2016/SVG/main" r:embed="rId9"/>
+                    </a:ext>
+                  </a:extLst>
+                </a:blip>
+                <a:stretch>
+                  <a:fillRect/>
+                </a:stretch>
+              </p:blipFill>
+              <p:spPr>
+                <a:xfrm>
+                  <a:off x="7125496" y="2508790"/>
+                  <a:ext cx="180000" cy="180000"/>
+                </a:xfrm>
+                <a:prstGeom prst="rect">
+                  <a:avLst/>
+                </a:prstGeom>
+              </p:spPr>
+            </p:pic>
+            <p:sp>
+              <p:nvSpPr>
+                <p:cNvPr id="37" name="Rectangle 36">
+                  <a:extLst>
+                    <a:ext uri="{FF2B5EF4-FFF2-40B4-BE49-F238E27FC236}">
+                      <a16:creationId xmlns:a16="http://schemas.microsoft.com/office/drawing/2014/main" id="{6F5F446E-3A27-4538-83CD-BA848FA89E0D}"/>
+                    </a:ext>
+                  </a:extLst>
+                </p:cNvPr>
+                <p:cNvSpPr/>
+                <p:nvPr/>
+              </p:nvSpPr>
+              <p:spPr>
+                <a:xfrm>
+                  <a:off x="6697498" y="2849611"/>
+                  <a:ext cx="2452254" cy="382385"/>
+                </a:xfrm>
+                <a:prstGeom prst="rect">
+                  <a:avLst/>
+                </a:prstGeom>
+                <a:solidFill>
+                  <a:schemeClr val="bg1">
+                    <a:lumMod val="95000"/>
+                  </a:schemeClr>
+                </a:solidFill>
+                <a:ln>
+                  <a:noFill/>
+                </a:ln>
+                <a:effectLst>
+                  <a:innerShdw blurRad="63500">
+                    <a:prstClr val="black">
+                      <a:alpha val="50000"/>
+                    </a:prstClr>
+                  </a:innerShdw>
+                </a:effectLst>
+              </p:spPr>
+              <p:style>
+                <a:lnRef idx="2">
+                  <a:schemeClr val="accent3">
+                    <a:shade val="50000"/>
+                  </a:schemeClr>
+                </a:lnRef>
+                <a:fillRef idx="1">
+                  <a:schemeClr val="accent3"/>
+                </a:fillRef>
+                <a:effectRef idx="0">
+                  <a:schemeClr val="accent3"/>
+                </a:effectRef>
+                <a:fontRef idx="minor">
+                  <a:schemeClr val="lt1"/>
+                </a:fontRef>
+              </p:style>
+              <p:txBody>
+                <a:bodyPr rtlCol="0" anchor="ctr"/>
+                <a:lstStyle/>
+                <a:p>
+                  <a:pPr algn="ctr"/>
+                  <a:r>
+                    <a:rPr lang="fr-FR" dirty="0">
+                      <a:solidFill>
+                        <a:schemeClr val="bg1">
+                          <a:lumMod val="75000"/>
+                        </a:schemeClr>
+                      </a:solidFill>
+                    </a:rPr>
+                    <a:t>spécialité</a:t>
+                  </a:r>
+                </a:p>
+              </p:txBody>
+            </p:sp>
+          </p:grpSp>
+          <p:sp>
+            <p:nvSpPr>
+              <p:cNvPr id="40" name="ZoneTexte 39">
+                <a:extLst>
+                  <a:ext uri="{FF2B5EF4-FFF2-40B4-BE49-F238E27FC236}">
+                    <a16:creationId xmlns:a16="http://schemas.microsoft.com/office/drawing/2014/main" id="{4719F2AD-89CB-458D-BA7D-5D3894934DF5}"/>
+                  </a:ext>
+                </a:extLst>
+              </p:cNvPr>
+              <p:cNvSpPr txBox="1"/>
               <p:nvPr/>
             </p:nvSpPr>
             <p:spPr>
               <a:xfrm>
-                <a:off x="6641181" y="2417007"/>
-                <a:ext cx="2452254" cy="382385"/>
+                <a:off x="4985210" y="172780"/>
+                <a:ext cx="2221580" cy="584775"/>
               </a:xfrm>
               <a:prstGeom prst="rect">
                 <a:avLst/>
               </a:prstGeom>
-              <a:solidFill>
-                <a:schemeClr val="bg1">
-                  <a:lumMod val="95000"/>
-                </a:schemeClr>
-              </a:solidFill>
-              <a:ln>
-                <a:noFill/>
-              </a:ln>
+              <a:noFill/>
             </p:spPr>
-            <p:style>
-              <a:lnRef idx="2">
-                <a:schemeClr val="accent3">
-                  <a:shade val="50000"/>
-                </a:schemeClr>
-              </a:lnRef>
-              <a:fillRef idx="1">
-                <a:schemeClr val="accent3"/>
-              </a:fillRef>
-              <a:effectRef idx="0">
-                <a:schemeClr val="accent3"/>
-              </a:effectRef>
-              <a:fontRef idx="minor">
-                <a:schemeClr val="lt1"/>
-              </a:fontRef>
-            </p:style>
             <p:txBody>
-              <a:bodyPr rtlCol="0" anchor="ctr"/>
+              <a:bodyPr wrap="square" rtlCol="0">
+                <a:spAutoFit/>
+              </a:bodyPr>
               <a:lstStyle/>
               <a:p>
                 <a:pPr algn="ctr"/>
                 <a:r>
-                  <a:rPr lang="fr-FR" dirty="0">
+                  <a:rPr lang="fr-FR" sz="3200" dirty="0" err="1">
                     <a:solidFill>
-                      <a:schemeClr val="bg1">
-                        <a:lumMod val="75000"/>
-                      </a:schemeClr>
+                      <a:schemeClr val="bg1"/>
                     </a:solidFill>
                   </a:rPr>
-                  <a:t>email</a:t>
+                  <a:t>Aurion</a:t>
                 </a:r>
-              </a:p>
-            </p:txBody>
-          </p:sp>
-          <p:pic>
-            <p:nvPicPr>
-              <p:cNvPr id="32" name="Graphique 31" descr="Adresse de courrier contour">
-                <a:extLst>
-                  <a:ext uri="{FF2B5EF4-FFF2-40B4-BE49-F238E27FC236}">
-                    <a16:creationId xmlns:a16="http://schemas.microsoft.com/office/drawing/2014/main" id="{883744CB-5781-4F9D-BDA9-7A7E6FC39FF5}"/>
-                  </a:ext>
-                </a:extLst>
-              </p:cNvPr>
-              <p:cNvPicPr>
-                <a:picLocks noChangeAspect="1"/>
-              </p:cNvPicPr>
-              <p:nvPr/>
-            </p:nvPicPr>
-            <p:blipFill>
-              <a:blip r:embed="rId6">
-                <a:extLst>
-                  <a:ext uri="{28A0092B-C50C-407E-A947-70E740481C1C}">
-                    <a14:useLocalDpi xmlns:a14="http://schemas.microsoft.com/office/drawing/2010/main" val="0"/>
-                  </a:ext>
-                  <a:ext uri="{96DAC541-7B7A-43D3-8B79-37D633B846F1}">
-                    <asvg:svgBlip xmlns:asvg="http://schemas.microsoft.com/office/drawing/2016/SVG/main" r:embed="rId7"/>
-                  </a:ext>
-                </a:extLst>
-              </a:blip>
-              <a:stretch>
-                <a:fillRect/>
-              </a:stretch>
-            </p:blipFill>
-            <p:spPr>
-              <a:xfrm>
-                <a:off x="7069179" y="2518199"/>
-                <a:ext cx="180000" cy="180000"/>
-              </a:xfrm>
-              <a:prstGeom prst="rect">
-                <a:avLst/>
-              </a:prstGeom>
-            </p:spPr>
-          </p:pic>
-          <p:sp>
-            <p:nvSpPr>
-              <p:cNvPr id="33" name="Rectangle 32">
-                <a:extLst>
-                  <a:ext uri="{FF2B5EF4-FFF2-40B4-BE49-F238E27FC236}">
-                    <a16:creationId xmlns:a16="http://schemas.microsoft.com/office/drawing/2014/main" id="{B3B0BE9C-C7B5-4BE1-827F-E11BB83E2D54}"/>
-                  </a:ext>
-                </a:extLst>
-              </p:cNvPr>
-              <p:cNvSpPr/>
-              <p:nvPr/>
-            </p:nvSpPr>
-            <p:spPr>
-              <a:xfrm>
-                <a:off x="6641181" y="2859019"/>
-                <a:ext cx="2452254" cy="382385"/>
-              </a:xfrm>
-              <a:prstGeom prst="rect">
-                <a:avLst/>
-              </a:prstGeom>
-              <a:solidFill>
-                <a:schemeClr val="bg1">
-                  <a:lumMod val="95000"/>
-                </a:schemeClr>
-              </a:solidFill>
-              <a:ln>
-                <a:noFill/>
-              </a:ln>
-            </p:spPr>
-            <p:style>
-              <a:lnRef idx="2">
-                <a:schemeClr val="accent3">
-                  <a:shade val="50000"/>
-                </a:schemeClr>
-              </a:lnRef>
-              <a:fillRef idx="1">
-                <a:schemeClr val="accent3"/>
-              </a:fillRef>
-              <a:effectRef idx="0">
-                <a:schemeClr val="accent3"/>
-              </a:effectRef>
-              <a:fontRef idx="minor">
-                <a:schemeClr val="lt1"/>
-              </a:fontRef>
-            </p:style>
-            <p:txBody>
-              <a:bodyPr rtlCol="0" anchor="ctr"/>
-              <a:lstStyle/>
-              <a:p>
-                <a:pPr algn="ctr"/>
                 <a:r>
-                  <a:rPr lang="fr-FR" dirty="0">
+                  <a:rPr lang="fr-FR" sz="3200" dirty="0">
                     <a:solidFill>
-                      <a:schemeClr val="bg1">
-                        <a:lumMod val="75000"/>
-                      </a:schemeClr>
+                      <a:schemeClr val="bg1"/>
                     </a:solidFill>
                   </a:rPr>
-                  <a:t>niveau</a:t>
-                </a:r>
-              </a:p>
-            </p:txBody>
-          </p:sp>
-          <p:pic>
-            <p:nvPicPr>
-              <p:cNvPr id="36" name="Graphique 35" descr="Classe contour">
-                <a:extLst>
-                  <a:ext uri="{FF2B5EF4-FFF2-40B4-BE49-F238E27FC236}">
-                    <a16:creationId xmlns:a16="http://schemas.microsoft.com/office/drawing/2014/main" id="{D860043F-B0C0-43B4-97EB-A5C5837C9CBD}"/>
-                  </a:ext>
-                </a:extLst>
-              </p:cNvPr>
-              <p:cNvPicPr>
-                <a:picLocks noChangeAspect="1"/>
-              </p:cNvPicPr>
-              <p:nvPr/>
-            </p:nvPicPr>
-            <p:blipFill>
-              <a:blip r:embed="rId8">
-                <a:extLst>
-                  <a:ext uri="{28A0092B-C50C-407E-A947-70E740481C1C}">
-                    <a14:useLocalDpi xmlns:a14="http://schemas.microsoft.com/office/drawing/2010/main" val="0"/>
-                  </a:ext>
-                  <a:ext uri="{96DAC541-7B7A-43D3-8B79-37D633B846F1}">
-                    <asvg:svgBlip xmlns:asvg="http://schemas.microsoft.com/office/drawing/2016/SVG/main" r:embed="rId9"/>
-                  </a:ext>
-                </a:extLst>
-              </a:blip>
-              <a:stretch>
-                <a:fillRect/>
-              </a:stretch>
-            </p:blipFill>
-            <p:spPr>
-              <a:xfrm>
-                <a:off x="7069179" y="2960211"/>
-                <a:ext cx="180000" cy="180000"/>
-              </a:xfrm>
-              <a:prstGeom prst="rect">
-                <a:avLst/>
-              </a:prstGeom>
-            </p:spPr>
-          </p:pic>
-          <p:sp>
-            <p:nvSpPr>
-              <p:cNvPr id="37" name="Rectangle 36">
-                <a:extLst>
-                  <a:ext uri="{FF2B5EF4-FFF2-40B4-BE49-F238E27FC236}">
-                    <a16:creationId xmlns:a16="http://schemas.microsoft.com/office/drawing/2014/main" id="{6F5F446E-3A27-4538-83CD-BA848FA89E0D}"/>
-                  </a:ext>
-                </a:extLst>
-              </p:cNvPr>
-              <p:cNvSpPr/>
-              <p:nvPr/>
-            </p:nvSpPr>
-            <p:spPr>
-              <a:xfrm>
-                <a:off x="6641181" y="3301031"/>
-                <a:ext cx="2452254" cy="382385"/>
-              </a:xfrm>
-              <a:prstGeom prst="rect">
-                <a:avLst/>
-              </a:prstGeom>
-              <a:solidFill>
-                <a:schemeClr val="bg1">
-                  <a:lumMod val="95000"/>
-                </a:schemeClr>
-              </a:solidFill>
-              <a:ln>
-                <a:noFill/>
-              </a:ln>
-            </p:spPr>
-            <p:style>
-              <a:lnRef idx="2">
-                <a:schemeClr val="accent3">
-                  <a:shade val="50000"/>
-                </a:schemeClr>
-              </a:lnRef>
-              <a:fillRef idx="1">
-                <a:schemeClr val="accent3"/>
-              </a:fillRef>
-              <a:effectRef idx="0">
-                <a:schemeClr val="accent3"/>
-              </a:effectRef>
-              <a:fontRef idx="minor">
-                <a:schemeClr val="lt1"/>
-              </a:fontRef>
-            </p:style>
-            <p:txBody>
-              <a:bodyPr rtlCol="0" anchor="ctr"/>
-              <a:lstStyle/>
-              <a:p>
-                <a:pPr algn="ctr"/>
-                <a:r>
-                  <a:rPr lang="fr-FR" dirty="0">
-                    <a:solidFill>
-                      <a:schemeClr val="bg1">
-                        <a:lumMod val="75000"/>
-                      </a:schemeClr>
-                    </a:solidFill>
-                  </a:rPr>
-                  <a:t>spécialité</a:t>
+                  <a:t> Pro</a:t>
                 </a:r>
               </a:p>
             </p:txBody>
           </p:sp>
         </p:grpSp>
-        <p:sp>
-          <p:nvSpPr>
-            <p:cNvPr id="40" name="ZoneTexte 39">
+        <p:pic>
+          <p:nvPicPr>
+            <p:cNvPr id="43" name="Graphique 42" descr="Atome avec un remplissage uni">
               <a:extLst>
                 <a:ext uri="{FF2B5EF4-FFF2-40B4-BE49-F238E27FC236}">
-                  <a16:creationId xmlns:a16="http://schemas.microsoft.com/office/drawing/2014/main" id="{4719F2AD-89CB-458D-BA7D-5D3894934DF5}"/>
+                  <a16:creationId xmlns:a16="http://schemas.microsoft.com/office/drawing/2014/main" id="{729CF695-B528-4406-93E9-13742C2B904D}"/>
                 </a:ext>
               </a:extLst>
             </p:cNvPr>
-            <p:cNvSpPr txBox="1"/>
+            <p:cNvPicPr>
+              <a:picLocks noChangeAspect="1"/>
+            </p:cNvPicPr>
             <p:nvPr/>
-          </p:nvSpPr>
+          </p:nvPicPr>
+          <p:blipFill>
+            <a:blip r:embed="rId10">
+              <a:extLst>
+                <a:ext uri="{28A0092B-C50C-407E-A947-70E740481C1C}">
+                  <a14:useLocalDpi xmlns:a14="http://schemas.microsoft.com/office/drawing/2010/main" val="0"/>
+                </a:ext>
+                <a:ext uri="{96DAC541-7B7A-43D3-8B79-37D633B846F1}">
+                  <asvg:svgBlip xmlns:asvg="http://schemas.microsoft.com/office/drawing/2016/SVG/main" r:embed="rId11"/>
+                </a:ext>
+              </a:extLst>
+            </a:blip>
+            <a:stretch>
+              <a:fillRect/>
+            </a:stretch>
+          </p:blipFill>
           <p:spPr>
             <a:xfrm>
-              <a:off x="4985210" y="172780"/>
-              <a:ext cx="2221580" cy="584775"/>
+              <a:off x="7813392" y="4928763"/>
+              <a:ext cx="306000" cy="306000"/>
             </a:xfrm>
             <a:prstGeom prst="rect">
               <a:avLst/>
             </a:prstGeom>
+          </p:spPr>
+        </p:pic>
+      </p:grpSp>
+      <p:sp>
+        <p:nvSpPr>
+          <p:cNvPr id="3" name="Rectangle : coins arrondis 2">
+            <a:extLst>
+              <a:ext uri="{FF2B5EF4-FFF2-40B4-BE49-F238E27FC236}">
+                <a16:creationId xmlns:a16="http://schemas.microsoft.com/office/drawing/2014/main" id="{C714F7BD-AA68-2041-B06F-258D8BF4B2E6}"/>
+              </a:ext>
+            </a:extLst>
+          </p:cNvPr>
+          <p:cNvSpPr/>
+          <p:nvPr/>
+        </p:nvSpPr>
+        <p:spPr>
+          <a:xfrm>
+            <a:off x="2146198" y="5747847"/>
+            <a:ext cx="1585260" cy="455171"/>
+          </a:xfrm>
+          <a:prstGeom prst="roundRect">
+            <a:avLst>
+              <a:gd name="adj" fmla="val 50000"/>
+            </a:avLst>
+          </a:prstGeom>
+          <a:solidFill>
+            <a:schemeClr val="bg2"/>
+          </a:solidFill>
+          <a:ln>
             <a:noFill/>
-          </p:spPr>
-          <p:txBody>
-            <a:bodyPr wrap="square" rtlCol="0">
-              <a:spAutoFit/>
-            </a:bodyPr>
-            <a:lstStyle/>
-            <a:p>
-              <a:pPr algn="ctr"/>
-              <a:r>
-                <a:rPr lang="fr-FR" sz="3200" dirty="0" err="1">
-                  <a:solidFill>
-                    <a:schemeClr val="bg1"/>
-                  </a:solidFill>
-                </a:rPr>
-                <a:t>Aurion</a:t>
-              </a:r>
-              <a:r>
-                <a:rPr lang="fr-FR" sz="3200" dirty="0">
-                  <a:solidFill>
-                    <a:schemeClr val="bg1"/>
-                  </a:solidFill>
-                </a:rPr>
-                <a:t> Pro</a:t>
-              </a:r>
-            </a:p>
-          </p:txBody>
-        </p:sp>
-      </p:grpSp>
+          </a:ln>
+          <a:effectLst>
+            <a:outerShdw blurRad="63500" sx="102000" sy="102000" algn="ctr" rotWithShape="0">
+              <a:prstClr val="black">
+                <a:alpha val="40000"/>
+              </a:prstClr>
+            </a:outerShdw>
+          </a:effectLst>
+        </p:spPr>
+        <p:style>
+          <a:lnRef idx="2">
+            <a:schemeClr val="accent1">
+              <a:shade val="50000"/>
+            </a:schemeClr>
+          </a:lnRef>
+          <a:fillRef idx="1">
+            <a:schemeClr val="accent1"/>
+          </a:fillRef>
+          <a:effectRef idx="0">
+            <a:schemeClr val="accent1"/>
+          </a:effectRef>
+          <a:fontRef idx="minor">
+            <a:schemeClr val="lt1"/>
+          </a:fontRef>
+        </p:style>
+        <p:txBody>
+          <a:bodyPr rtlCol="0" anchor="ctr"/>
+          <a:lstStyle/>
+          <a:p>
+            <a:pPr algn="ctr"/>
+            <a:endParaRPr lang="fr-FR" dirty="0"/>
+          </a:p>
+        </p:txBody>
+      </p:sp>
       <p:pic>
         <p:nvPicPr>
-          <p:cNvPr id="43" name="Graphique 42" descr="Atome avec un remplissage uni">
-            <a:extLst>
-              <a:ext uri="{FF2B5EF4-FFF2-40B4-BE49-F238E27FC236}">
-                <a16:creationId xmlns:a16="http://schemas.microsoft.com/office/drawing/2014/main" id="{729CF695-B528-4406-93E9-13742C2B904D}"/>
+          <p:cNvPr id="10" name="Graphique 9" descr="Coche contour">
+            <a:extLst>
+              <a:ext uri="{FF2B5EF4-FFF2-40B4-BE49-F238E27FC236}">
+                <a16:creationId xmlns:a16="http://schemas.microsoft.com/office/drawing/2014/main" id="{CBC47316-949A-874F-BEF0-C40F544BD319}"/>
               </a:ext>
             </a:extLst>
           </p:cNvPr>
@@ -5010,13 +5194,13 @@
           <p:nvPr/>
         </p:nvPicPr>
         <p:blipFill>
-          <a:blip r:embed="rId10">
+          <a:blip r:embed="rId12">
             <a:extLst>
               <a:ext uri="{28A0092B-C50C-407E-A947-70E740481C1C}">
                 <a14:useLocalDpi xmlns:a14="http://schemas.microsoft.com/office/drawing/2010/main" val="0"/>
               </a:ext>
               <a:ext uri="{96DAC541-7B7A-43D3-8B79-37D633B846F1}">
-                <asvg:svgBlip xmlns:asvg="http://schemas.microsoft.com/office/drawing/2016/SVG/main" r:embed="rId11"/>
+                <asvg:svgBlip xmlns:asvg="http://schemas.microsoft.com/office/drawing/2016/SVG/main" r:embed="rId13"/>
               </a:ext>
             </a:extLst>
           </a:blip>
@@ -5026,7 +5210,107 @@
         </p:blipFill>
         <p:spPr>
           <a:xfrm>
-            <a:off x="7717903" y="5642215"/>
+            <a:off x="2785828" y="5822432"/>
+            <a:ext cx="306000" cy="306000"/>
+          </a:xfrm>
+          <a:prstGeom prst="rect">
+            <a:avLst/>
+          </a:prstGeom>
+        </p:spPr>
+      </p:pic>
+      <p:sp>
+        <p:nvSpPr>
+          <p:cNvPr id="34" name="Rectangle : coins arrondis 33">
+            <a:extLst>
+              <a:ext uri="{FF2B5EF4-FFF2-40B4-BE49-F238E27FC236}">
+                <a16:creationId xmlns:a16="http://schemas.microsoft.com/office/drawing/2014/main" id="{F96874D4-9DED-B747-A00B-5B5D194DF65A}"/>
+              </a:ext>
+            </a:extLst>
+          </p:cNvPr>
+          <p:cNvSpPr/>
+          <p:nvPr/>
+        </p:nvSpPr>
+        <p:spPr>
+          <a:xfrm>
+            <a:off x="8460542" y="5817417"/>
+            <a:ext cx="1585260" cy="455171"/>
+          </a:xfrm>
+          <a:prstGeom prst="roundRect">
+            <a:avLst>
+              <a:gd name="adj" fmla="val 50000"/>
+            </a:avLst>
+          </a:prstGeom>
+          <a:solidFill>
+            <a:schemeClr val="bg2"/>
+          </a:solidFill>
+          <a:ln>
+            <a:noFill/>
+          </a:ln>
+          <a:effectLst>
+            <a:outerShdw blurRad="63500" sx="102000" sy="102000" algn="ctr" rotWithShape="0">
+              <a:prstClr val="black">
+                <a:alpha val="40000"/>
+              </a:prstClr>
+            </a:outerShdw>
+          </a:effectLst>
+        </p:spPr>
+        <p:style>
+          <a:lnRef idx="2">
+            <a:schemeClr val="accent1">
+              <a:shade val="50000"/>
+            </a:schemeClr>
+          </a:lnRef>
+          <a:fillRef idx="1">
+            <a:schemeClr val="accent1"/>
+          </a:fillRef>
+          <a:effectRef idx="0">
+            <a:schemeClr val="accent1"/>
+          </a:effectRef>
+          <a:fontRef idx="minor">
+            <a:schemeClr val="lt1"/>
+          </a:fontRef>
+        </p:style>
+        <p:txBody>
+          <a:bodyPr rtlCol="0" anchor="ctr"/>
+          <a:lstStyle/>
+          <a:p>
+            <a:pPr algn="ctr"/>
+            <a:endParaRPr lang="fr-FR" dirty="0"/>
+          </a:p>
+        </p:txBody>
+      </p:sp>
+      <p:pic>
+        <p:nvPicPr>
+          <p:cNvPr id="35" name="Graphique 34" descr="Coche contour">
+            <a:extLst>
+              <a:ext uri="{FF2B5EF4-FFF2-40B4-BE49-F238E27FC236}">
+                <a16:creationId xmlns:a16="http://schemas.microsoft.com/office/drawing/2014/main" id="{663AC56F-DDD2-9C45-BFDF-20E6E23478E7}"/>
+              </a:ext>
+            </a:extLst>
+          </p:cNvPr>
+          <p:cNvPicPr>
+            <a:picLocks noChangeAspect="1"/>
+          </p:cNvPicPr>
+          <p:nvPr/>
+        </p:nvPicPr>
+        <p:blipFill>
+          <a:blip r:embed="rId12">
+            <a:extLst>
+              <a:ext uri="{28A0092B-C50C-407E-A947-70E740481C1C}">
+                <a14:useLocalDpi xmlns:a14="http://schemas.microsoft.com/office/drawing/2010/main" val="0"/>
+              </a:ext>
+              <a:ext uri="{96DAC541-7B7A-43D3-8B79-37D633B846F1}">
+                <asvg:svgBlip xmlns:asvg="http://schemas.microsoft.com/office/drawing/2016/SVG/main" r:embed="rId13"/>
+              </a:ext>
+            </a:extLst>
+          </a:blip>
+          <a:stretch>
+            <a:fillRect/>
+          </a:stretch>
+        </p:blipFill>
+        <p:spPr>
+          <a:xfrm>
+            <a:off x="9100172" y="5892002"/>
             <a:ext cx="306000" cy="306000"/>
           </a:xfrm>
           <a:prstGeom prst="rect">

</xml_diff>